<commit_message>
Final Project with Updated Code
</commit_message>
<xml_diff>
--- a/FinalProject.pptx
+++ b/FinalProject.pptx
@@ -5,10 +5,10 @@
     <p:sldMasterId id="2147483648" r:id="rId4"/>
   </p:sldMasterIdLst>
   <p:notesMasterIdLst>
-    <p:notesMasterId r:id="rId13"/>
+    <p:notesMasterId r:id="rId21"/>
   </p:notesMasterIdLst>
   <p:handoutMasterIdLst>
-    <p:handoutMasterId r:id="rId14"/>
+    <p:handoutMasterId r:id="rId22"/>
   </p:handoutMasterIdLst>
   <p:sldIdLst>
     <p:sldId id="256" r:id="rId5"/>
@@ -16,9 +16,17 @@
     <p:sldId id="259" r:id="rId7"/>
     <p:sldId id="276" r:id="rId8"/>
     <p:sldId id="277" r:id="rId9"/>
-    <p:sldId id="278" r:id="rId10"/>
-    <p:sldId id="279" r:id="rId11"/>
-    <p:sldId id="275" r:id="rId12"/>
+    <p:sldId id="281" r:id="rId10"/>
+    <p:sldId id="278" r:id="rId11"/>
+    <p:sldId id="279" r:id="rId12"/>
+    <p:sldId id="280" r:id="rId13"/>
+    <p:sldId id="283" r:id="rId14"/>
+    <p:sldId id="284" r:id="rId15"/>
+    <p:sldId id="282" r:id="rId16"/>
+    <p:sldId id="286" r:id="rId17"/>
+    <p:sldId id="285" r:id="rId18"/>
+    <p:sldId id="287" r:id="rId19"/>
+    <p:sldId id="275" r:id="rId20"/>
   </p:sldIdLst>
   <p:sldSz cx="12192000" cy="6858000"/>
   <p:notesSz cx="6858000" cy="9144000"/>
@@ -234,7 +242,7 @@
           <a:p>
             <a:fld id="{9D8190EA-5EEC-4300-B6AE-D9734C6C648E}" type="datetimeFigureOut">
               <a:rPr lang="en-US" smtClean="0"/>
-              <a:t>12/2/2023</a:t>
+              <a:t>12/5/2023</a:t>
             </a:fld>
             <a:endParaRPr lang="en-US" dirty="0"/>
           </a:p>
@@ -411,7 +419,7 @@
           <a:p>
             <a:fld id="{7487ADD9-2083-264C-A652-8D52D02F7E72}" type="datetimeFigureOut">
               <a:rPr lang="en-US" smtClean="0"/>
-              <a:t>12/2/2023</a:t>
+              <a:t>12/5/2023</a:t>
             </a:fld>
             <a:endParaRPr lang="en-US" dirty="0"/>
           </a:p>
@@ -14007,7 +14015,7 @@
         </p:nvSpPr>
         <p:spPr>
           <a:xfrm>
-            <a:off x="1167493" y="232913"/>
+            <a:off x="1167493" y="1278311"/>
             <a:ext cx="7096933" cy="3277050"/>
           </a:xfrm>
         </p:spPr>
@@ -14016,8 +14024,44 @@
           <a:lstStyle/>
           <a:p>
             <a:r>
-              <a:rPr lang="en-US" sz="3200" dirty="0"/>
+              <a:rPr lang="en-US" sz="3200" dirty="0">
+                <a:latin typeface="Times New Roman" panose="02020603050405020304" pitchFamily="18" charset="0"/>
+                <a:cs typeface="Times New Roman" panose="02020603050405020304" pitchFamily="18" charset="0"/>
+              </a:rPr>
               <a:t>Authentication &amp; Authorization Project</a:t>
+            </a:r>
+            <a:br>
+              <a:rPr lang="en-US" sz="3200" dirty="0">
+                <a:latin typeface="Times New Roman" panose="02020603050405020304" pitchFamily="18" charset="0"/>
+                <a:cs typeface="Times New Roman" panose="02020603050405020304" pitchFamily="18" charset="0"/>
+              </a:rPr>
+            </a:br>
+            <a:br>
+              <a:rPr lang="en-US" sz="3200" dirty="0">
+                <a:latin typeface="Times New Roman" panose="02020603050405020304" pitchFamily="18" charset="0"/>
+                <a:cs typeface="Times New Roman" panose="02020603050405020304" pitchFamily="18" charset="0"/>
+              </a:rPr>
+            </a:br>
+            <a:r>
+              <a:rPr lang="en-US" sz="2000" dirty="0">
+                <a:latin typeface="Times New Roman" panose="02020603050405020304" pitchFamily="18" charset="0"/>
+                <a:cs typeface="Times New Roman" panose="02020603050405020304" pitchFamily="18" charset="0"/>
+              </a:rPr>
+              <a:t>Professor Name: </a:t>
+            </a:r>
+            <a:r>
+              <a:rPr lang="en-US" sz="2000" dirty="0" err="1">
+                <a:latin typeface="Times New Roman" panose="02020603050405020304" pitchFamily="18" charset="0"/>
+                <a:cs typeface="Times New Roman" panose="02020603050405020304" pitchFamily="18" charset="0"/>
+              </a:rPr>
+              <a:t>Nital</a:t>
+            </a:r>
+            <a:r>
+              <a:rPr lang="en-US" sz="2000" dirty="0">
+                <a:latin typeface="Times New Roman" panose="02020603050405020304" pitchFamily="18" charset="0"/>
+                <a:cs typeface="Times New Roman" panose="02020603050405020304" pitchFamily="18" charset="0"/>
+              </a:rPr>
+              <a:t> Shah</a:t>
             </a:r>
           </a:p>
         </p:txBody>
@@ -14040,7 +14084,7 @@
         </p:nvSpPr>
         <p:spPr>
           <a:xfrm>
-            <a:off x="1167493" y="3575404"/>
+            <a:off x="1167493" y="3941164"/>
             <a:ext cx="9857014" cy="621603"/>
           </a:xfrm>
         </p:spPr>
@@ -14059,6 +14103,746 @@
     <p:extLst>
       <p:ext uri="{BB962C8B-B14F-4D97-AF65-F5344CB8AC3E}">
         <p14:creationId xmlns:p14="http://schemas.microsoft.com/office/powerpoint/2010/main" val="2259308896"/>
+      </p:ext>
+    </p:extLst>
+  </p:cSld>
+  <p:clrMapOvr>
+    <a:masterClrMapping/>
+  </p:clrMapOvr>
+</p:sld>
+</file>
+
+<file path=ppt/slides/slide10.xml><?xml version="1.0" encoding="utf-8"?>
+<p:sld xmlns:a="http://schemas.openxmlformats.org/drawingml/2006/main" xmlns:r="http://schemas.openxmlformats.org/officeDocument/2006/relationships" xmlns:p="http://schemas.openxmlformats.org/presentationml/2006/main">
+  <p:cSld>
+    <p:spTree>
+      <p:nvGrpSpPr>
+        <p:cNvPr id="1" name=""/>
+        <p:cNvGrpSpPr/>
+        <p:nvPr/>
+      </p:nvGrpSpPr>
+      <p:grpSpPr>
+        <a:xfrm>
+          <a:off x="0" y="0"/>
+          <a:ext cx="0" cy="0"/>
+          <a:chOff x="0" y="0"/>
+          <a:chExt cx="0" cy="0"/>
+        </a:xfrm>
+      </p:grpSpPr>
+      <p:sp>
+        <p:nvSpPr>
+          <p:cNvPr id="2" name="Title 1">
+            <a:extLst>
+              <a:ext uri="{FF2B5EF4-FFF2-40B4-BE49-F238E27FC236}">
+                <a16:creationId xmlns:a16="http://schemas.microsoft.com/office/drawing/2014/main" id="{35B54118-67EE-68D9-2D6F-0693E3636977}"/>
+              </a:ext>
+            </a:extLst>
+          </p:cNvPr>
+          <p:cNvSpPr>
+            <a:spLocks noGrp="1"/>
+          </p:cNvSpPr>
+          <p:nvPr>
+            <p:ph type="ctrTitle"/>
+          </p:nvPr>
+        </p:nvSpPr>
+        <p:spPr/>
+        <p:txBody>
+          <a:bodyPr/>
+          <a:lstStyle/>
+          <a:p>
+            <a:endParaRPr lang="en-US"/>
+          </a:p>
+        </p:txBody>
+      </p:sp>
+      <p:sp>
+        <p:nvSpPr>
+          <p:cNvPr id="3" name="Subtitle 2">
+            <a:extLst>
+              <a:ext uri="{FF2B5EF4-FFF2-40B4-BE49-F238E27FC236}">
+                <a16:creationId xmlns:a16="http://schemas.microsoft.com/office/drawing/2014/main" id="{FD227478-9DC2-88F7-2BB8-6F6C565E5353}"/>
+              </a:ext>
+            </a:extLst>
+          </p:cNvPr>
+          <p:cNvSpPr>
+            <a:spLocks noGrp="1"/>
+          </p:cNvSpPr>
+          <p:nvPr>
+            <p:ph type="subTitle" idx="1"/>
+          </p:nvPr>
+        </p:nvSpPr>
+        <p:spPr/>
+        <p:txBody>
+          <a:bodyPr/>
+          <a:lstStyle/>
+          <a:p>
+            <a:endParaRPr lang="en-US"/>
+          </a:p>
+        </p:txBody>
+      </p:sp>
+      <p:pic>
+        <p:nvPicPr>
+          <p:cNvPr id="5" name="Picture 4" descr="A screenshot of a computer&#10;&#10;Description automatically generated">
+            <a:extLst>
+              <a:ext uri="{FF2B5EF4-FFF2-40B4-BE49-F238E27FC236}">
+                <a16:creationId xmlns:a16="http://schemas.microsoft.com/office/drawing/2014/main" id="{AC95384A-0131-724B-E6C2-1FC3175F1623}"/>
+              </a:ext>
+            </a:extLst>
+          </p:cNvPr>
+          <p:cNvPicPr>
+            <a:picLocks noChangeAspect="1"/>
+          </p:cNvPicPr>
+          <p:nvPr/>
+        </p:nvPicPr>
+        <p:blipFill>
+          <a:blip r:embed="rId2"/>
+          <a:stretch>
+            <a:fillRect/>
+          </a:stretch>
+        </p:blipFill>
+        <p:spPr>
+          <a:xfrm>
+            <a:off x="0" y="148941"/>
+            <a:ext cx="12192000" cy="6560117"/>
+          </a:xfrm>
+          <a:prstGeom prst="rect">
+            <a:avLst/>
+          </a:prstGeom>
+        </p:spPr>
+      </p:pic>
+    </p:spTree>
+    <p:extLst>
+      <p:ext uri="{BB962C8B-B14F-4D97-AF65-F5344CB8AC3E}">
+        <p14:creationId xmlns:p14="http://schemas.microsoft.com/office/powerpoint/2010/main" val="900461641"/>
+      </p:ext>
+    </p:extLst>
+  </p:cSld>
+  <p:clrMapOvr>
+    <a:masterClrMapping/>
+  </p:clrMapOvr>
+</p:sld>
+</file>
+
+<file path=ppt/slides/slide11.xml><?xml version="1.0" encoding="utf-8"?>
+<p:sld xmlns:a="http://schemas.openxmlformats.org/drawingml/2006/main" xmlns:r="http://schemas.openxmlformats.org/officeDocument/2006/relationships" xmlns:p="http://schemas.openxmlformats.org/presentationml/2006/main">
+  <p:cSld>
+    <p:spTree>
+      <p:nvGrpSpPr>
+        <p:cNvPr id="1" name=""/>
+        <p:cNvGrpSpPr/>
+        <p:nvPr/>
+      </p:nvGrpSpPr>
+      <p:grpSpPr>
+        <a:xfrm>
+          <a:off x="0" y="0"/>
+          <a:ext cx="0" cy="0"/>
+          <a:chOff x="0" y="0"/>
+          <a:chExt cx="0" cy="0"/>
+        </a:xfrm>
+      </p:grpSpPr>
+      <p:sp>
+        <p:nvSpPr>
+          <p:cNvPr id="2" name="Title 1">
+            <a:extLst>
+              <a:ext uri="{FF2B5EF4-FFF2-40B4-BE49-F238E27FC236}">
+                <a16:creationId xmlns:a16="http://schemas.microsoft.com/office/drawing/2014/main" id="{35B54118-67EE-68D9-2D6F-0693E3636977}"/>
+              </a:ext>
+            </a:extLst>
+          </p:cNvPr>
+          <p:cNvSpPr>
+            <a:spLocks noGrp="1"/>
+          </p:cNvSpPr>
+          <p:nvPr>
+            <p:ph type="ctrTitle"/>
+          </p:nvPr>
+        </p:nvSpPr>
+        <p:spPr/>
+        <p:txBody>
+          <a:bodyPr/>
+          <a:lstStyle/>
+          <a:p>
+            <a:endParaRPr lang="en-US"/>
+          </a:p>
+        </p:txBody>
+      </p:sp>
+      <p:sp>
+        <p:nvSpPr>
+          <p:cNvPr id="3" name="Subtitle 2">
+            <a:extLst>
+              <a:ext uri="{FF2B5EF4-FFF2-40B4-BE49-F238E27FC236}">
+                <a16:creationId xmlns:a16="http://schemas.microsoft.com/office/drawing/2014/main" id="{FD227478-9DC2-88F7-2BB8-6F6C565E5353}"/>
+              </a:ext>
+            </a:extLst>
+          </p:cNvPr>
+          <p:cNvSpPr>
+            <a:spLocks noGrp="1"/>
+          </p:cNvSpPr>
+          <p:nvPr>
+            <p:ph type="subTitle" idx="1"/>
+          </p:nvPr>
+        </p:nvSpPr>
+        <p:spPr/>
+        <p:txBody>
+          <a:bodyPr/>
+          <a:lstStyle/>
+          <a:p>
+            <a:endParaRPr lang="en-US"/>
+          </a:p>
+        </p:txBody>
+      </p:sp>
+      <p:pic>
+        <p:nvPicPr>
+          <p:cNvPr id="5" name="Picture 4" descr="A screenshot of a computer&#10;&#10;Description automatically generated">
+            <a:extLst>
+              <a:ext uri="{FF2B5EF4-FFF2-40B4-BE49-F238E27FC236}">
+                <a16:creationId xmlns:a16="http://schemas.microsoft.com/office/drawing/2014/main" id="{ED9332BD-B6B3-899C-A72F-A885B6ABEDEE}"/>
+              </a:ext>
+            </a:extLst>
+          </p:cNvPr>
+          <p:cNvPicPr>
+            <a:picLocks noChangeAspect="1"/>
+          </p:cNvPicPr>
+          <p:nvPr/>
+        </p:nvPicPr>
+        <p:blipFill>
+          <a:blip r:embed="rId2"/>
+          <a:stretch>
+            <a:fillRect/>
+          </a:stretch>
+        </p:blipFill>
+        <p:spPr>
+          <a:xfrm>
+            <a:off x="0" y="117316"/>
+            <a:ext cx="12192000" cy="6623367"/>
+          </a:xfrm>
+          <a:prstGeom prst="rect">
+            <a:avLst/>
+          </a:prstGeom>
+        </p:spPr>
+      </p:pic>
+    </p:spTree>
+    <p:extLst>
+      <p:ext uri="{BB962C8B-B14F-4D97-AF65-F5344CB8AC3E}">
+        <p14:creationId xmlns:p14="http://schemas.microsoft.com/office/powerpoint/2010/main" val="3292830185"/>
+      </p:ext>
+    </p:extLst>
+  </p:cSld>
+  <p:clrMapOvr>
+    <a:masterClrMapping/>
+  </p:clrMapOvr>
+</p:sld>
+</file>
+
+<file path=ppt/slides/slide12.xml><?xml version="1.0" encoding="utf-8"?>
+<p:sld xmlns:a="http://schemas.openxmlformats.org/drawingml/2006/main" xmlns:r="http://schemas.openxmlformats.org/officeDocument/2006/relationships" xmlns:p="http://schemas.openxmlformats.org/presentationml/2006/main">
+  <p:cSld>
+    <p:spTree>
+      <p:nvGrpSpPr>
+        <p:cNvPr id="1" name=""/>
+        <p:cNvGrpSpPr/>
+        <p:nvPr/>
+      </p:nvGrpSpPr>
+      <p:grpSpPr>
+        <a:xfrm>
+          <a:off x="0" y="0"/>
+          <a:ext cx="0" cy="0"/>
+          <a:chOff x="0" y="0"/>
+          <a:chExt cx="0" cy="0"/>
+        </a:xfrm>
+      </p:grpSpPr>
+      <p:sp>
+        <p:nvSpPr>
+          <p:cNvPr id="2" name="Title 1">
+            <a:extLst>
+              <a:ext uri="{FF2B5EF4-FFF2-40B4-BE49-F238E27FC236}">
+                <a16:creationId xmlns:a16="http://schemas.microsoft.com/office/drawing/2014/main" id="{35B54118-67EE-68D9-2D6F-0693E3636977}"/>
+              </a:ext>
+            </a:extLst>
+          </p:cNvPr>
+          <p:cNvSpPr>
+            <a:spLocks noGrp="1"/>
+          </p:cNvSpPr>
+          <p:nvPr>
+            <p:ph type="ctrTitle"/>
+          </p:nvPr>
+        </p:nvSpPr>
+        <p:spPr/>
+        <p:txBody>
+          <a:bodyPr/>
+          <a:lstStyle/>
+          <a:p>
+            <a:endParaRPr lang="en-US"/>
+          </a:p>
+        </p:txBody>
+      </p:sp>
+      <p:sp>
+        <p:nvSpPr>
+          <p:cNvPr id="3" name="Subtitle 2">
+            <a:extLst>
+              <a:ext uri="{FF2B5EF4-FFF2-40B4-BE49-F238E27FC236}">
+                <a16:creationId xmlns:a16="http://schemas.microsoft.com/office/drawing/2014/main" id="{FD227478-9DC2-88F7-2BB8-6F6C565E5353}"/>
+              </a:ext>
+            </a:extLst>
+          </p:cNvPr>
+          <p:cNvSpPr>
+            <a:spLocks noGrp="1"/>
+          </p:cNvSpPr>
+          <p:nvPr>
+            <p:ph type="subTitle" idx="1"/>
+          </p:nvPr>
+        </p:nvSpPr>
+        <p:spPr/>
+        <p:txBody>
+          <a:bodyPr/>
+          <a:lstStyle/>
+          <a:p>
+            <a:endParaRPr lang="en-US"/>
+          </a:p>
+        </p:txBody>
+      </p:sp>
+      <p:pic>
+        <p:nvPicPr>
+          <p:cNvPr id="7" name="Picture 6" descr="A screenshot of a computer&#10;&#10;Description automatically generated">
+            <a:extLst>
+              <a:ext uri="{FF2B5EF4-FFF2-40B4-BE49-F238E27FC236}">
+                <a16:creationId xmlns:a16="http://schemas.microsoft.com/office/drawing/2014/main" id="{B92A44C4-670E-339D-ECA2-97FA7CC36BA9}"/>
+              </a:ext>
+            </a:extLst>
+          </p:cNvPr>
+          <p:cNvPicPr>
+            <a:picLocks noChangeAspect="1"/>
+          </p:cNvPicPr>
+          <p:nvPr/>
+        </p:nvPicPr>
+        <p:blipFill>
+          <a:blip r:embed="rId2"/>
+          <a:stretch>
+            <a:fillRect/>
+          </a:stretch>
+        </p:blipFill>
+        <p:spPr>
+          <a:xfrm>
+            <a:off x="0" y="119743"/>
+            <a:ext cx="12192000" cy="6618514"/>
+          </a:xfrm>
+          <a:prstGeom prst="rect">
+            <a:avLst/>
+          </a:prstGeom>
+        </p:spPr>
+      </p:pic>
+    </p:spTree>
+    <p:extLst>
+      <p:ext uri="{BB962C8B-B14F-4D97-AF65-F5344CB8AC3E}">
+        <p14:creationId xmlns:p14="http://schemas.microsoft.com/office/powerpoint/2010/main" val="1965973111"/>
+      </p:ext>
+    </p:extLst>
+  </p:cSld>
+  <p:clrMapOvr>
+    <a:masterClrMapping/>
+  </p:clrMapOvr>
+</p:sld>
+</file>
+
+<file path=ppt/slides/slide13.xml><?xml version="1.0" encoding="utf-8"?>
+<p:sld xmlns:a="http://schemas.openxmlformats.org/drawingml/2006/main" xmlns:r="http://schemas.openxmlformats.org/officeDocument/2006/relationships" xmlns:p="http://schemas.openxmlformats.org/presentationml/2006/main">
+  <p:cSld>
+    <p:spTree>
+      <p:nvGrpSpPr>
+        <p:cNvPr id="1" name=""/>
+        <p:cNvGrpSpPr/>
+        <p:nvPr/>
+      </p:nvGrpSpPr>
+      <p:grpSpPr>
+        <a:xfrm>
+          <a:off x="0" y="0"/>
+          <a:ext cx="0" cy="0"/>
+          <a:chOff x="0" y="0"/>
+          <a:chExt cx="0" cy="0"/>
+        </a:xfrm>
+      </p:grpSpPr>
+      <p:sp>
+        <p:nvSpPr>
+          <p:cNvPr id="2" name="Title 1">
+            <a:extLst>
+              <a:ext uri="{FF2B5EF4-FFF2-40B4-BE49-F238E27FC236}">
+                <a16:creationId xmlns:a16="http://schemas.microsoft.com/office/drawing/2014/main" id="{35B54118-67EE-68D9-2D6F-0693E3636977}"/>
+              </a:ext>
+            </a:extLst>
+          </p:cNvPr>
+          <p:cNvSpPr>
+            <a:spLocks noGrp="1"/>
+          </p:cNvSpPr>
+          <p:nvPr>
+            <p:ph type="ctrTitle"/>
+          </p:nvPr>
+        </p:nvSpPr>
+        <p:spPr/>
+        <p:txBody>
+          <a:bodyPr/>
+          <a:lstStyle/>
+          <a:p>
+            <a:endParaRPr lang="en-US"/>
+          </a:p>
+        </p:txBody>
+      </p:sp>
+      <p:sp>
+        <p:nvSpPr>
+          <p:cNvPr id="3" name="Subtitle 2">
+            <a:extLst>
+              <a:ext uri="{FF2B5EF4-FFF2-40B4-BE49-F238E27FC236}">
+                <a16:creationId xmlns:a16="http://schemas.microsoft.com/office/drawing/2014/main" id="{FD227478-9DC2-88F7-2BB8-6F6C565E5353}"/>
+              </a:ext>
+            </a:extLst>
+          </p:cNvPr>
+          <p:cNvSpPr>
+            <a:spLocks noGrp="1"/>
+          </p:cNvSpPr>
+          <p:nvPr>
+            <p:ph type="subTitle" idx="1"/>
+          </p:nvPr>
+        </p:nvSpPr>
+        <p:spPr/>
+        <p:txBody>
+          <a:bodyPr/>
+          <a:lstStyle/>
+          <a:p>
+            <a:endParaRPr lang="en-US"/>
+          </a:p>
+        </p:txBody>
+      </p:sp>
+      <p:pic>
+        <p:nvPicPr>
+          <p:cNvPr id="5" name="Picture 4" descr="A screenshot of a computer&#10;&#10;Description automatically generated">
+            <a:extLst>
+              <a:ext uri="{FF2B5EF4-FFF2-40B4-BE49-F238E27FC236}">
+                <a16:creationId xmlns:a16="http://schemas.microsoft.com/office/drawing/2014/main" id="{863B3B6C-FC30-CB6F-7A47-732E8658723A}"/>
+              </a:ext>
+            </a:extLst>
+          </p:cNvPr>
+          <p:cNvPicPr>
+            <a:picLocks noChangeAspect="1"/>
+          </p:cNvPicPr>
+          <p:nvPr/>
+        </p:nvPicPr>
+        <p:blipFill>
+          <a:blip r:embed="rId2"/>
+          <a:stretch>
+            <a:fillRect/>
+          </a:stretch>
+        </p:blipFill>
+        <p:spPr>
+          <a:xfrm>
+            <a:off x="0" y="126628"/>
+            <a:ext cx="12192000" cy="6604744"/>
+          </a:xfrm>
+          <a:prstGeom prst="rect">
+            <a:avLst/>
+          </a:prstGeom>
+        </p:spPr>
+      </p:pic>
+    </p:spTree>
+    <p:extLst>
+      <p:ext uri="{BB962C8B-B14F-4D97-AF65-F5344CB8AC3E}">
+        <p14:creationId xmlns:p14="http://schemas.microsoft.com/office/powerpoint/2010/main" val="2719529525"/>
+      </p:ext>
+    </p:extLst>
+  </p:cSld>
+  <p:clrMapOvr>
+    <a:masterClrMapping/>
+  </p:clrMapOvr>
+</p:sld>
+</file>
+
+<file path=ppt/slides/slide14.xml><?xml version="1.0" encoding="utf-8"?>
+<p:sld xmlns:a="http://schemas.openxmlformats.org/drawingml/2006/main" xmlns:r="http://schemas.openxmlformats.org/officeDocument/2006/relationships" xmlns:p="http://schemas.openxmlformats.org/presentationml/2006/main">
+  <p:cSld>
+    <p:spTree>
+      <p:nvGrpSpPr>
+        <p:cNvPr id="1" name=""/>
+        <p:cNvGrpSpPr/>
+        <p:nvPr/>
+      </p:nvGrpSpPr>
+      <p:grpSpPr>
+        <a:xfrm>
+          <a:off x="0" y="0"/>
+          <a:ext cx="0" cy="0"/>
+          <a:chOff x="0" y="0"/>
+          <a:chExt cx="0" cy="0"/>
+        </a:xfrm>
+      </p:grpSpPr>
+      <p:sp>
+        <p:nvSpPr>
+          <p:cNvPr id="2" name="Title 1">
+            <a:extLst>
+              <a:ext uri="{FF2B5EF4-FFF2-40B4-BE49-F238E27FC236}">
+                <a16:creationId xmlns:a16="http://schemas.microsoft.com/office/drawing/2014/main" id="{35B54118-67EE-68D9-2D6F-0693E3636977}"/>
+              </a:ext>
+            </a:extLst>
+          </p:cNvPr>
+          <p:cNvSpPr>
+            <a:spLocks noGrp="1"/>
+          </p:cNvSpPr>
+          <p:nvPr>
+            <p:ph type="ctrTitle"/>
+          </p:nvPr>
+        </p:nvSpPr>
+        <p:spPr/>
+        <p:txBody>
+          <a:bodyPr/>
+          <a:lstStyle/>
+          <a:p>
+            <a:endParaRPr lang="en-US"/>
+          </a:p>
+        </p:txBody>
+      </p:sp>
+      <p:sp>
+        <p:nvSpPr>
+          <p:cNvPr id="3" name="Subtitle 2">
+            <a:extLst>
+              <a:ext uri="{FF2B5EF4-FFF2-40B4-BE49-F238E27FC236}">
+                <a16:creationId xmlns:a16="http://schemas.microsoft.com/office/drawing/2014/main" id="{FD227478-9DC2-88F7-2BB8-6F6C565E5353}"/>
+              </a:ext>
+            </a:extLst>
+          </p:cNvPr>
+          <p:cNvSpPr>
+            <a:spLocks noGrp="1"/>
+          </p:cNvSpPr>
+          <p:nvPr>
+            <p:ph type="subTitle" idx="1"/>
+          </p:nvPr>
+        </p:nvSpPr>
+        <p:spPr/>
+        <p:txBody>
+          <a:bodyPr/>
+          <a:lstStyle/>
+          <a:p>
+            <a:endParaRPr lang="en-US"/>
+          </a:p>
+        </p:txBody>
+      </p:sp>
+      <p:pic>
+        <p:nvPicPr>
+          <p:cNvPr id="5" name="Picture 4" descr="A screenshot of a computer&#10;&#10;Description automatically generated">
+            <a:extLst>
+              <a:ext uri="{FF2B5EF4-FFF2-40B4-BE49-F238E27FC236}">
+                <a16:creationId xmlns:a16="http://schemas.microsoft.com/office/drawing/2014/main" id="{B6207622-B424-B2FC-38BC-95E972A2C02E}"/>
+              </a:ext>
+            </a:extLst>
+          </p:cNvPr>
+          <p:cNvPicPr>
+            <a:picLocks noChangeAspect="1"/>
+          </p:cNvPicPr>
+          <p:nvPr/>
+        </p:nvPicPr>
+        <p:blipFill>
+          <a:blip r:embed="rId2"/>
+          <a:stretch>
+            <a:fillRect/>
+          </a:stretch>
+        </p:blipFill>
+        <p:spPr>
+          <a:xfrm>
+            <a:off x="0" y="126628"/>
+            <a:ext cx="12192000" cy="6604744"/>
+          </a:xfrm>
+          <a:prstGeom prst="rect">
+            <a:avLst/>
+          </a:prstGeom>
+        </p:spPr>
+      </p:pic>
+    </p:spTree>
+    <p:extLst>
+      <p:ext uri="{BB962C8B-B14F-4D97-AF65-F5344CB8AC3E}">
+        <p14:creationId xmlns:p14="http://schemas.microsoft.com/office/powerpoint/2010/main" val="1859583043"/>
+      </p:ext>
+    </p:extLst>
+  </p:cSld>
+  <p:clrMapOvr>
+    <a:masterClrMapping/>
+  </p:clrMapOvr>
+</p:sld>
+</file>
+
+<file path=ppt/slides/slide15.xml><?xml version="1.0" encoding="utf-8"?>
+<p:sld xmlns:a="http://schemas.openxmlformats.org/drawingml/2006/main" xmlns:r="http://schemas.openxmlformats.org/officeDocument/2006/relationships" xmlns:p="http://schemas.openxmlformats.org/presentationml/2006/main">
+  <p:cSld>
+    <p:spTree>
+      <p:nvGrpSpPr>
+        <p:cNvPr id="1" name=""/>
+        <p:cNvGrpSpPr/>
+        <p:nvPr/>
+      </p:nvGrpSpPr>
+      <p:grpSpPr>
+        <a:xfrm>
+          <a:off x="0" y="0"/>
+          <a:ext cx="0" cy="0"/>
+          <a:chOff x="0" y="0"/>
+          <a:chExt cx="0" cy="0"/>
+        </a:xfrm>
+      </p:grpSpPr>
+      <p:sp>
+        <p:nvSpPr>
+          <p:cNvPr id="2" name="Title 1">
+            <a:extLst>
+              <a:ext uri="{FF2B5EF4-FFF2-40B4-BE49-F238E27FC236}">
+                <a16:creationId xmlns:a16="http://schemas.microsoft.com/office/drawing/2014/main" id="{35B54118-67EE-68D9-2D6F-0693E3636977}"/>
+              </a:ext>
+            </a:extLst>
+          </p:cNvPr>
+          <p:cNvSpPr>
+            <a:spLocks noGrp="1"/>
+          </p:cNvSpPr>
+          <p:nvPr>
+            <p:ph type="ctrTitle"/>
+          </p:nvPr>
+        </p:nvSpPr>
+        <p:spPr/>
+        <p:txBody>
+          <a:bodyPr/>
+          <a:lstStyle/>
+          <a:p>
+            <a:r>
+              <a:rPr lang="en-US" dirty="0">
+                <a:latin typeface="Times New Roman" panose="02020603050405020304" pitchFamily="18" charset="0"/>
+                <a:cs typeface="Times New Roman" panose="02020603050405020304" pitchFamily="18" charset="0"/>
+              </a:rPr>
+              <a:t>Any Queries???</a:t>
+            </a:r>
+          </a:p>
+        </p:txBody>
+      </p:sp>
+      <p:sp>
+        <p:nvSpPr>
+          <p:cNvPr id="3" name="Subtitle 2">
+            <a:extLst>
+              <a:ext uri="{FF2B5EF4-FFF2-40B4-BE49-F238E27FC236}">
+                <a16:creationId xmlns:a16="http://schemas.microsoft.com/office/drawing/2014/main" id="{FD227478-9DC2-88F7-2BB8-6F6C565E5353}"/>
+              </a:ext>
+            </a:extLst>
+          </p:cNvPr>
+          <p:cNvSpPr>
+            <a:spLocks noGrp="1"/>
+          </p:cNvSpPr>
+          <p:nvPr>
+            <p:ph type="subTitle" idx="1"/>
+          </p:nvPr>
+        </p:nvSpPr>
+        <p:spPr/>
+        <p:txBody>
+          <a:bodyPr/>
+          <a:lstStyle/>
+          <a:p>
+            <a:r>
+              <a:rPr lang="en-US" dirty="0"/>
+              <a:t>…</a:t>
+            </a:r>
+          </a:p>
+        </p:txBody>
+      </p:sp>
+    </p:spTree>
+    <p:extLst>
+      <p:ext uri="{BB962C8B-B14F-4D97-AF65-F5344CB8AC3E}">
+        <p14:creationId xmlns:p14="http://schemas.microsoft.com/office/powerpoint/2010/main" val="2244223795"/>
+      </p:ext>
+    </p:extLst>
+  </p:cSld>
+  <p:clrMapOvr>
+    <a:masterClrMapping/>
+  </p:clrMapOvr>
+</p:sld>
+</file>
+
+<file path=ppt/slides/slide16.xml><?xml version="1.0" encoding="utf-8"?>
+<p:sld xmlns:a="http://schemas.openxmlformats.org/drawingml/2006/main" xmlns:r="http://schemas.openxmlformats.org/officeDocument/2006/relationships" xmlns:p="http://schemas.openxmlformats.org/presentationml/2006/main">
+  <p:cSld>
+    <p:spTree>
+      <p:nvGrpSpPr>
+        <p:cNvPr id="1" name=""/>
+        <p:cNvGrpSpPr/>
+        <p:nvPr/>
+      </p:nvGrpSpPr>
+      <p:grpSpPr>
+        <a:xfrm>
+          <a:off x="0" y="0"/>
+          <a:ext cx="0" cy="0"/>
+          <a:chOff x="0" y="0"/>
+          <a:chExt cx="0" cy="0"/>
+        </a:xfrm>
+      </p:grpSpPr>
+      <p:sp>
+        <p:nvSpPr>
+          <p:cNvPr id="2" name="Title 1">
+            <a:extLst>
+              <a:ext uri="{FF2B5EF4-FFF2-40B4-BE49-F238E27FC236}">
+                <a16:creationId xmlns:a16="http://schemas.microsoft.com/office/drawing/2014/main" id="{69FAE308-3076-43DB-B834-DA0B0AE19AF9}"/>
+              </a:ext>
+            </a:extLst>
+          </p:cNvPr>
+          <p:cNvSpPr>
+            <a:spLocks noGrp="1"/>
+          </p:cNvSpPr>
+          <p:nvPr>
+            <p:ph type="ctrTitle"/>
+          </p:nvPr>
+        </p:nvSpPr>
+        <p:spPr>
+          <a:xfrm>
+            <a:off x="1167494" y="252549"/>
+            <a:ext cx="6220278" cy="3257414"/>
+          </a:xfrm>
+        </p:spPr>
+        <p:txBody>
+          <a:bodyPr/>
+          <a:lstStyle/>
+          <a:p>
+            <a:r>
+              <a:rPr lang="en-US" dirty="0">
+                <a:latin typeface="Times New Roman" panose="02020603050405020304" pitchFamily="18" charset="0"/>
+                <a:cs typeface="Times New Roman" panose="02020603050405020304" pitchFamily="18" charset="0"/>
+              </a:rPr>
+              <a:t>Thank You</a:t>
+            </a:r>
+          </a:p>
+        </p:txBody>
+      </p:sp>
+      <p:sp>
+        <p:nvSpPr>
+          <p:cNvPr id="3" name="Content Placeholder 2">
+            <a:extLst>
+              <a:ext uri="{FF2B5EF4-FFF2-40B4-BE49-F238E27FC236}">
+                <a16:creationId xmlns:a16="http://schemas.microsoft.com/office/drawing/2014/main" id="{BABC2CE0-8806-4B2A-A10A-32984D317434}"/>
+              </a:ext>
+            </a:extLst>
+          </p:cNvPr>
+          <p:cNvSpPr>
+            <a:spLocks noGrp="1"/>
+          </p:cNvSpPr>
+          <p:nvPr>
+            <p:ph type="subTitle" idx="1"/>
+          </p:nvPr>
+        </p:nvSpPr>
+        <p:spPr>
+          <a:xfrm>
+            <a:off x="1167493" y="3685939"/>
+            <a:ext cx="6220277" cy="2919512"/>
+          </a:xfrm>
+        </p:spPr>
+        <p:txBody>
+          <a:bodyPr>
+            <a:normAutofit/>
+          </a:bodyPr>
+          <a:lstStyle/>
+          <a:p>
+            <a:r>
+              <a:rPr lang="en-US" dirty="0"/>
+              <a:t>.</a:t>
+            </a:r>
+          </a:p>
+        </p:txBody>
+      </p:sp>
+    </p:spTree>
+    <p:extLst>
+      <p:ext uri="{BB962C8B-B14F-4D97-AF65-F5344CB8AC3E}">
+        <p14:creationId xmlns:p14="http://schemas.microsoft.com/office/powerpoint/2010/main" val="926184573"/>
       </p:ext>
     </p:extLst>
   </p:cSld>
@@ -14112,7 +14896,10 @@
           <a:lstStyle/>
           <a:p>
             <a:r>
-              <a:rPr lang="en-US" dirty="0"/>
+              <a:rPr lang="en-US" dirty="0">
+                <a:latin typeface="Times New Roman" panose="02020603050405020304" pitchFamily="18" charset="0"/>
+                <a:cs typeface="Times New Roman" panose="02020603050405020304" pitchFamily="18" charset="0"/>
+              </a:rPr>
               <a:t>Introduction</a:t>
             </a:r>
           </a:p>
@@ -14147,7 +14934,10 @@
           <a:lstStyle/>
           <a:p>
             <a:r>
-              <a:rPr lang="en-US" dirty="0"/>
+              <a:rPr lang="en-US" dirty="0">
+                <a:latin typeface="Times New Roman" panose="02020603050405020304" pitchFamily="18" charset="0"/>
+                <a:cs typeface="Times New Roman" panose="02020603050405020304" pitchFamily="18" charset="0"/>
+              </a:rPr>
               <a:t>This project demonstrates the use of Authentication and Authorization Concept as shown in the screenshot in upcoming slides.</a:t>
             </a:r>
           </a:p>
@@ -14311,7 +15101,10 @@
           <a:lstStyle/>
           <a:p>
             <a:r>
-              <a:rPr lang="en-US" dirty="0"/>
+              <a:rPr lang="en-US" dirty="0">
+                <a:latin typeface="Times New Roman" panose="02020603050405020304" pitchFamily="18" charset="0"/>
+                <a:cs typeface="Times New Roman" panose="02020603050405020304" pitchFamily="18" charset="0"/>
+              </a:rPr>
               <a:t>Team Members</a:t>
             </a:r>
           </a:p>
@@ -14335,7 +15128,7 @@
         </p:nvSpPr>
         <p:spPr>
           <a:xfrm>
-            <a:off x="1167494" y="3492895"/>
+            <a:off x="1167494" y="3447000"/>
             <a:ext cx="6245912" cy="2433771"/>
           </a:xfrm>
         </p:spPr>
@@ -14346,29 +15139,44 @@
           <a:lstStyle/>
           <a:p>
             <a:r>
-              <a:rPr lang="en-US" dirty="0"/>
+              <a:rPr lang="en-US" sz="2400" dirty="0">
+                <a:latin typeface="Times New Roman" panose="02020603050405020304" pitchFamily="18" charset="0"/>
+                <a:cs typeface="Times New Roman" panose="02020603050405020304" pitchFamily="18" charset="0"/>
+              </a:rPr>
               <a:t>Suraj Tamang</a:t>
             </a:r>
           </a:p>
           <a:p>
             <a:r>
-              <a:rPr lang="en-US" dirty="0"/>
+              <a:rPr lang="en-US" sz="2400" dirty="0">
+                <a:latin typeface="Times New Roman" panose="02020603050405020304" pitchFamily="18" charset="0"/>
+                <a:cs typeface="Times New Roman" panose="02020603050405020304" pitchFamily="18" charset="0"/>
+              </a:rPr>
               <a:t>Dinesh Saud</a:t>
             </a:r>
           </a:p>
           <a:p>
             <a:r>
-              <a:rPr lang="en-US" dirty="0"/>
+              <a:rPr lang="en-US" sz="2400" dirty="0">
+                <a:latin typeface="Times New Roman" panose="02020603050405020304" pitchFamily="18" charset="0"/>
+                <a:cs typeface="Times New Roman" panose="02020603050405020304" pitchFamily="18" charset="0"/>
+              </a:rPr>
               <a:t>Amit Magar</a:t>
             </a:r>
           </a:p>
           <a:p>
             <a:r>
-              <a:rPr lang="en-US" dirty="0" err="1"/>
+              <a:rPr lang="en-US" sz="2400" dirty="0" err="1">
+                <a:latin typeface="Times New Roman" panose="02020603050405020304" pitchFamily="18" charset="0"/>
+                <a:cs typeface="Times New Roman" panose="02020603050405020304" pitchFamily="18" charset="0"/>
+              </a:rPr>
               <a:t>Biplove</a:t>
             </a:r>
             <a:r>
-              <a:rPr lang="en-US" dirty="0"/>
+              <a:rPr lang="en-US" sz="2400" dirty="0">
+                <a:latin typeface="Times New Roman" panose="02020603050405020304" pitchFamily="18" charset="0"/>
+                <a:cs typeface="Times New Roman" panose="02020603050405020304" pitchFamily="18" charset="0"/>
+              </a:rPr>
               <a:t> Jaisi</a:t>
             </a:r>
           </a:p>
@@ -14456,10 +15264,10 @@
       </p:sp>
       <p:pic>
         <p:nvPicPr>
-          <p:cNvPr id="5" name="Picture 4" descr="A screenshot of a computer&#10;&#10;Description automatically generated">
-            <a:extLst>
-              <a:ext uri="{FF2B5EF4-FFF2-40B4-BE49-F238E27FC236}">
-                <a16:creationId xmlns:a16="http://schemas.microsoft.com/office/drawing/2014/main" id="{190D0FE7-1263-52EE-2C10-00BAA5E6E73C}"/>
+          <p:cNvPr id="6" name="Picture 5" descr="A screenshot of a computer&#10;&#10;Description automatically generated">
+            <a:extLst>
+              <a:ext uri="{FF2B5EF4-FFF2-40B4-BE49-F238E27FC236}">
+                <a16:creationId xmlns:a16="http://schemas.microsoft.com/office/drawing/2014/main" id="{185D319B-ABE4-5A7C-CD5C-793DEDBD4F1A}"/>
               </a:ext>
             </a:extLst>
           </p:cNvPr>
@@ -14476,8 +15284,8 @@
         </p:blipFill>
         <p:spPr>
           <a:xfrm>
-            <a:off x="0" y="135553"/>
-            <a:ext cx="12192000" cy="6586893"/>
+            <a:off x="0" y="159936"/>
+            <a:ext cx="12192000" cy="6538127"/>
           </a:xfrm>
           <a:prstGeom prst="rect">
             <a:avLst/>
@@ -14566,10 +15374,10 @@
       </p:sp>
       <p:pic>
         <p:nvPicPr>
-          <p:cNvPr id="5" name="Picture 4" descr="A screenshot of a computer&#10;&#10;Description automatically generated">
-            <a:extLst>
-              <a:ext uri="{FF2B5EF4-FFF2-40B4-BE49-F238E27FC236}">
-                <a16:creationId xmlns:a16="http://schemas.microsoft.com/office/drawing/2014/main" id="{F36F6697-740C-9AD1-1B13-2D454C219B11}"/>
+          <p:cNvPr id="6" name="Picture 5" descr="A screenshot of a computer screen&#10;&#10;Description automatically generated">
+            <a:extLst>
+              <a:ext uri="{FF2B5EF4-FFF2-40B4-BE49-F238E27FC236}">
+                <a16:creationId xmlns:a16="http://schemas.microsoft.com/office/drawing/2014/main" id="{62415697-D5DC-0E2F-BAD6-BEC1A8783CB6}"/>
               </a:ext>
             </a:extLst>
           </p:cNvPr>
@@ -14586,8 +15394,8 @@
         </p:blipFill>
         <p:spPr>
           <a:xfrm>
-            <a:off x="0" y="113240"/>
-            <a:ext cx="12192000" cy="6631520"/>
+            <a:off x="0" y="137606"/>
+            <a:ext cx="12192000" cy="6582787"/>
           </a:xfrm>
           <a:prstGeom prst="rect">
             <a:avLst/>
@@ -14629,7 +15437,7 @@
           <p:cNvPr id="2" name="Title 1">
             <a:extLst>
               <a:ext uri="{FF2B5EF4-FFF2-40B4-BE49-F238E27FC236}">
-                <a16:creationId xmlns:a16="http://schemas.microsoft.com/office/drawing/2014/main" id="{7FE5B383-BF1E-4D38-EA87-BC445731781A}"/>
+                <a16:creationId xmlns:a16="http://schemas.microsoft.com/office/drawing/2014/main" id="{35B54118-67EE-68D9-2D6F-0693E3636977}"/>
               </a:ext>
             </a:extLst>
           </p:cNvPr>
@@ -14654,7 +15462,7 @@
           <p:cNvPr id="3" name="Subtitle 2">
             <a:extLst>
               <a:ext uri="{FF2B5EF4-FFF2-40B4-BE49-F238E27FC236}">
-                <a16:creationId xmlns:a16="http://schemas.microsoft.com/office/drawing/2014/main" id="{E27BA0F4-EDA6-A659-9457-8B7B8C329291}"/>
+                <a16:creationId xmlns:a16="http://schemas.microsoft.com/office/drawing/2014/main" id="{FD227478-9DC2-88F7-2BB8-6F6C565E5353}"/>
               </a:ext>
             </a:extLst>
           </p:cNvPr>
@@ -14676,10 +15484,10 @@
       </p:sp>
       <p:pic>
         <p:nvPicPr>
-          <p:cNvPr id="5" name="Picture 4" descr="A screenshot of a computer&#10;&#10;Description automatically generated">
-            <a:extLst>
-              <a:ext uri="{FF2B5EF4-FFF2-40B4-BE49-F238E27FC236}">
-                <a16:creationId xmlns:a16="http://schemas.microsoft.com/office/drawing/2014/main" id="{E385D21C-8683-5F06-394E-D9588DDF259B}"/>
+          <p:cNvPr id="5" name="Picture 4" descr="A screenshot of a computer screen&#10;&#10;Description automatically generated">
+            <a:extLst>
+              <a:ext uri="{FF2B5EF4-FFF2-40B4-BE49-F238E27FC236}">
+                <a16:creationId xmlns:a16="http://schemas.microsoft.com/office/drawing/2014/main" id="{B2CDCA82-8085-236F-6831-4460F10CC3B7}"/>
               </a:ext>
             </a:extLst>
           </p:cNvPr>
@@ -14696,8 +15504,8 @@
         </p:blipFill>
         <p:spPr>
           <a:xfrm>
-            <a:off x="0" y="135553"/>
-            <a:ext cx="12192000" cy="6586893"/>
+            <a:off x="0" y="126628"/>
+            <a:ext cx="12192000" cy="6604744"/>
           </a:xfrm>
           <a:prstGeom prst="rect">
             <a:avLst/>
@@ -14707,7 +15515,7 @@
     </p:spTree>
     <p:extLst>
       <p:ext uri="{BB962C8B-B14F-4D97-AF65-F5344CB8AC3E}">
-        <p14:creationId xmlns:p14="http://schemas.microsoft.com/office/powerpoint/2010/main" val="3625760261"/>
+        <p14:creationId xmlns:p14="http://schemas.microsoft.com/office/powerpoint/2010/main" val="2498658261"/>
       </p:ext>
     </p:extLst>
   </p:cSld>
@@ -14739,7 +15547,7 @@
           <p:cNvPr id="2" name="Title 1">
             <a:extLst>
               <a:ext uri="{FF2B5EF4-FFF2-40B4-BE49-F238E27FC236}">
-                <a16:creationId xmlns:a16="http://schemas.microsoft.com/office/drawing/2014/main" id="{35B54118-67EE-68D9-2D6F-0693E3636977}"/>
+                <a16:creationId xmlns:a16="http://schemas.microsoft.com/office/drawing/2014/main" id="{7FE5B383-BF1E-4D38-EA87-BC445731781A}"/>
               </a:ext>
             </a:extLst>
           </p:cNvPr>
@@ -14764,7 +15572,7 @@
           <p:cNvPr id="3" name="Subtitle 2">
             <a:extLst>
               <a:ext uri="{FF2B5EF4-FFF2-40B4-BE49-F238E27FC236}">
-                <a16:creationId xmlns:a16="http://schemas.microsoft.com/office/drawing/2014/main" id="{FD227478-9DC2-88F7-2BB8-6F6C565E5353}"/>
+                <a16:creationId xmlns:a16="http://schemas.microsoft.com/office/drawing/2014/main" id="{E27BA0F4-EDA6-A659-9457-8B7B8C329291}"/>
               </a:ext>
             </a:extLst>
           </p:cNvPr>
@@ -14786,10 +15594,10 @@
       </p:sp>
       <p:pic>
         <p:nvPicPr>
-          <p:cNvPr id="5" name="Picture 4" descr="A screenshot of a computer&#10;&#10;Description automatically generated">
-            <a:extLst>
-              <a:ext uri="{FF2B5EF4-FFF2-40B4-BE49-F238E27FC236}">
-                <a16:creationId xmlns:a16="http://schemas.microsoft.com/office/drawing/2014/main" id="{D9B6BD91-BEA4-708C-87FC-AC006218EFB2}"/>
+          <p:cNvPr id="6" name="Picture 5" descr="A screenshot of a computer&#10;&#10;Description automatically generated">
+            <a:extLst>
+              <a:ext uri="{FF2B5EF4-FFF2-40B4-BE49-F238E27FC236}">
+                <a16:creationId xmlns:a16="http://schemas.microsoft.com/office/drawing/2014/main" id="{BAEE5D01-765A-87FE-1F87-EDF76BA4E48E}"/>
               </a:ext>
             </a:extLst>
           </p:cNvPr>
@@ -14806,8 +15614,8 @@
         </p:blipFill>
         <p:spPr>
           <a:xfrm>
-            <a:off x="0" y="126628"/>
-            <a:ext cx="12192000" cy="6604744"/>
+            <a:off x="0" y="128675"/>
+            <a:ext cx="12192000" cy="6600650"/>
           </a:xfrm>
           <a:prstGeom prst="rect">
             <a:avLst/>
@@ -14817,7 +15625,7 @@
     </p:spTree>
     <p:extLst>
       <p:ext uri="{BB962C8B-B14F-4D97-AF65-F5344CB8AC3E}">
-        <p14:creationId xmlns:p14="http://schemas.microsoft.com/office/powerpoint/2010/main" val="3524504245"/>
+        <p14:creationId xmlns:p14="http://schemas.microsoft.com/office/powerpoint/2010/main" val="3625760261"/>
       </p:ext>
     </p:extLst>
   </p:cSld>
@@ -14849,7 +15657,7 @@
           <p:cNvPr id="2" name="Title 1">
             <a:extLst>
               <a:ext uri="{FF2B5EF4-FFF2-40B4-BE49-F238E27FC236}">
-                <a16:creationId xmlns:a16="http://schemas.microsoft.com/office/drawing/2014/main" id="{69FAE308-3076-43DB-B834-DA0B0AE19AF9}"/>
+                <a16:creationId xmlns:a16="http://schemas.microsoft.com/office/drawing/2014/main" id="{35B54118-67EE-68D9-2D6F-0693E3636977}"/>
               </a:ext>
             </a:extLst>
           </p:cNvPr>
@@ -14860,29 +15668,21 @@
             <p:ph type="ctrTitle"/>
           </p:nvPr>
         </p:nvSpPr>
-        <p:spPr>
-          <a:xfrm>
-            <a:off x="1167494" y="252549"/>
-            <a:ext cx="6220278" cy="3257414"/>
-          </a:xfrm>
-        </p:spPr>
+        <p:spPr/>
         <p:txBody>
           <a:bodyPr/>
           <a:lstStyle/>
           <a:p>
-            <a:r>
-              <a:rPr lang="en-US" dirty="0"/>
-              <a:t>Thank you</a:t>
-            </a:r>
+            <a:endParaRPr lang="en-US"/>
           </a:p>
         </p:txBody>
       </p:sp>
       <p:sp>
         <p:nvSpPr>
-          <p:cNvPr id="3" name="Content Placeholder 2">
-            <a:extLst>
-              <a:ext uri="{FF2B5EF4-FFF2-40B4-BE49-F238E27FC236}">
-                <a16:creationId xmlns:a16="http://schemas.microsoft.com/office/drawing/2014/main" id="{BABC2CE0-8806-4B2A-A10A-32984D317434}"/>
+          <p:cNvPr id="3" name="Subtitle 2">
+            <a:extLst>
+              <a:ext uri="{FF2B5EF4-FFF2-40B4-BE49-F238E27FC236}">
+                <a16:creationId xmlns:a16="http://schemas.microsoft.com/office/drawing/2014/main" id="{FD227478-9DC2-88F7-2BB8-6F6C565E5353}"/>
               </a:ext>
             </a:extLst>
           </p:cNvPr>
@@ -14893,29 +15693,159 @@
             <p:ph type="subTitle" idx="1"/>
           </p:nvPr>
         </p:nvSpPr>
+        <p:spPr/>
+        <p:txBody>
+          <a:bodyPr/>
+          <a:lstStyle/>
+          <a:p>
+            <a:endParaRPr lang="en-US"/>
+          </a:p>
+        </p:txBody>
+      </p:sp>
+      <p:pic>
+        <p:nvPicPr>
+          <p:cNvPr id="6" name="Picture 5" descr="A screenshot of a computer&#10;&#10;Description automatically generated">
+            <a:extLst>
+              <a:ext uri="{FF2B5EF4-FFF2-40B4-BE49-F238E27FC236}">
+                <a16:creationId xmlns:a16="http://schemas.microsoft.com/office/drawing/2014/main" id="{A1A957AF-85DB-52A9-FB33-122D88ECB132}"/>
+              </a:ext>
+            </a:extLst>
+          </p:cNvPr>
+          <p:cNvPicPr>
+            <a:picLocks noChangeAspect="1"/>
+          </p:cNvPicPr>
+          <p:nvPr/>
+        </p:nvPicPr>
+        <p:blipFill>
+          <a:blip r:embed="rId2"/>
+          <a:stretch>
+            <a:fillRect/>
+          </a:stretch>
+        </p:blipFill>
         <p:spPr>
           <a:xfrm>
-            <a:off x="1167493" y="3685939"/>
-            <a:ext cx="6220277" cy="2919512"/>
+            <a:off x="0" y="153404"/>
+            <a:ext cx="12192000" cy="6551192"/>
           </a:xfrm>
+          <a:prstGeom prst="rect">
+            <a:avLst/>
+          </a:prstGeom>
         </p:spPr>
-        <p:txBody>
-          <a:bodyPr>
-            <a:normAutofit/>
-          </a:bodyPr>
-          <a:lstStyle/>
-          <a:p>
-            <a:r>
-              <a:rPr lang="en-US" dirty="0"/>
-              <a:t>.</a:t>
-            </a:r>
-          </a:p>
-        </p:txBody>
-      </p:sp>
+      </p:pic>
     </p:spTree>
     <p:extLst>
       <p:ext uri="{BB962C8B-B14F-4D97-AF65-F5344CB8AC3E}">
-        <p14:creationId xmlns:p14="http://schemas.microsoft.com/office/powerpoint/2010/main" val="926184573"/>
+        <p14:creationId xmlns:p14="http://schemas.microsoft.com/office/powerpoint/2010/main" val="3524504245"/>
+      </p:ext>
+    </p:extLst>
+  </p:cSld>
+  <p:clrMapOvr>
+    <a:masterClrMapping/>
+  </p:clrMapOvr>
+</p:sld>
+</file>
+
+<file path=ppt/slides/slide9.xml><?xml version="1.0" encoding="utf-8"?>
+<p:sld xmlns:a="http://schemas.openxmlformats.org/drawingml/2006/main" xmlns:r="http://schemas.openxmlformats.org/officeDocument/2006/relationships" xmlns:p="http://schemas.openxmlformats.org/presentationml/2006/main">
+  <p:cSld>
+    <p:spTree>
+      <p:nvGrpSpPr>
+        <p:cNvPr id="1" name=""/>
+        <p:cNvGrpSpPr/>
+        <p:nvPr/>
+      </p:nvGrpSpPr>
+      <p:grpSpPr>
+        <a:xfrm>
+          <a:off x="0" y="0"/>
+          <a:ext cx="0" cy="0"/>
+          <a:chOff x="0" y="0"/>
+          <a:chExt cx="0" cy="0"/>
+        </a:xfrm>
+      </p:grpSpPr>
+      <p:sp>
+        <p:nvSpPr>
+          <p:cNvPr id="2" name="Title 1">
+            <a:extLst>
+              <a:ext uri="{FF2B5EF4-FFF2-40B4-BE49-F238E27FC236}">
+                <a16:creationId xmlns:a16="http://schemas.microsoft.com/office/drawing/2014/main" id="{35B54118-67EE-68D9-2D6F-0693E3636977}"/>
+              </a:ext>
+            </a:extLst>
+          </p:cNvPr>
+          <p:cNvSpPr>
+            <a:spLocks noGrp="1"/>
+          </p:cNvSpPr>
+          <p:nvPr>
+            <p:ph type="ctrTitle"/>
+          </p:nvPr>
+        </p:nvSpPr>
+        <p:spPr/>
+        <p:txBody>
+          <a:bodyPr/>
+          <a:lstStyle/>
+          <a:p>
+            <a:endParaRPr lang="en-US"/>
+          </a:p>
+        </p:txBody>
+      </p:sp>
+      <p:sp>
+        <p:nvSpPr>
+          <p:cNvPr id="3" name="Subtitle 2">
+            <a:extLst>
+              <a:ext uri="{FF2B5EF4-FFF2-40B4-BE49-F238E27FC236}">
+                <a16:creationId xmlns:a16="http://schemas.microsoft.com/office/drawing/2014/main" id="{FD227478-9DC2-88F7-2BB8-6F6C565E5353}"/>
+              </a:ext>
+            </a:extLst>
+          </p:cNvPr>
+          <p:cNvSpPr>
+            <a:spLocks noGrp="1"/>
+          </p:cNvSpPr>
+          <p:nvPr>
+            <p:ph type="subTitle" idx="1"/>
+          </p:nvPr>
+        </p:nvSpPr>
+        <p:spPr/>
+        <p:txBody>
+          <a:bodyPr/>
+          <a:lstStyle/>
+          <a:p>
+            <a:endParaRPr lang="en-US"/>
+          </a:p>
+        </p:txBody>
+      </p:sp>
+      <p:pic>
+        <p:nvPicPr>
+          <p:cNvPr id="5" name="Picture 4" descr="A screenshot of a computer&#10;&#10;Description automatically generated">
+            <a:extLst>
+              <a:ext uri="{FF2B5EF4-FFF2-40B4-BE49-F238E27FC236}">
+                <a16:creationId xmlns:a16="http://schemas.microsoft.com/office/drawing/2014/main" id="{4346963E-36C2-252A-E19F-BCE274413D02}"/>
+              </a:ext>
+            </a:extLst>
+          </p:cNvPr>
+          <p:cNvPicPr>
+            <a:picLocks noChangeAspect="1"/>
+          </p:cNvPicPr>
+          <p:nvPr/>
+        </p:nvPicPr>
+        <p:blipFill>
+          <a:blip r:embed="rId2"/>
+          <a:stretch>
+            <a:fillRect/>
+          </a:stretch>
+        </p:blipFill>
+        <p:spPr>
+          <a:xfrm>
+            <a:off x="0" y="117703"/>
+            <a:ext cx="12192000" cy="6622594"/>
+          </a:xfrm>
+          <a:prstGeom prst="rect">
+            <a:avLst/>
+          </a:prstGeom>
+        </p:spPr>
+      </p:pic>
+    </p:spTree>
+    <p:extLst>
+      <p:ext uri="{BB962C8B-B14F-4D97-AF65-F5344CB8AC3E}">
+        <p14:creationId xmlns:p14="http://schemas.microsoft.com/office/powerpoint/2010/main" val="3167945824"/>
       </p:ext>
     </p:extLst>
   </p:cSld>
@@ -15717,26 +16647,6 @@
 </file>
 
 <file path=customXml/item1.xml><?xml version="1.0" encoding="utf-8"?>
-<p:properties xmlns:p="http://schemas.microsoft.com/office/2006/metadata/properties" xmlns:xsi="http://www.w3.org/2001/XMLSchema-instance" xmlns:pc="http://schemas.microsoft.com/office/infopath/2007/PartnerControls">
-  <documentManagement>
-    <_ip_UnifiedCompliancePolicyUIAction xmlns="http://schemas.microsoft.com/sharepoint/v3" xsi:nil="true"/>
-    <Image xmlns="71af3243-3dd4-4a8d-8c0d-dd76da1f02a5">
-      <Url xsi:nil="true"/>
-      <Description xsi:nil="true"/>
-    </Image>
-    <Status xmlns="71af3243-3dd4-4a8d-8c0d-dd76da1f02a5">Not started</Status>
-    <Background xmlns="71af3243-3dd4-4a8d-8c0d-dd76da1f02a5">false</Background>
-    <_ip_UnifiedCompliancePolicyProperties xmlns="http://schemas.microsoft.com/sharepoint/v3" xsi:nil="true"/>
-    <ImageTagsTaxHTField xmlns="71af3243-3dd4-4a8d-8c0d-dd76da1f02a5">
-      <Terms xmlns="http://schemas.microsoft.com/office/infopath/2007/PartnerControls"/>
-    </ImageTagsTaxHTField>
-    <TaxCatchAll xmlns="230e9df3-be65-4c73-a93b-d1236ebd677e" xsi:nil="true"/>
-    <MediaServiceKeyPoints xmlns="71af3243-3dd4-4a8d-8c0d-dd76da1f02a5" xsi:nil="true"/>
-  </documentManagement>
-</p:properties>
-</file>
-
-<file path=customXml/item2.xml><?xml version="1.0" encoding="utf-8"?>
 <ct:contentTypeSchema xmlns:ct="http://schemas.microsoft.com/office/2006/metadata/contentType" xmlns:ma="http://schemas.microsoft.com/office/2006/metadata/properties/metaAttributes" ct:_="" ma:_="" ma:contentTypeName="Document" ma:contentTypeID="0x01010079F111ED35F8CC479449609E8A0923A6" ma:contentTypeVersion="28" ma:contentTypeDescription="Create a new document." ma:contentTypeScope="" ma:versionID="60f5a4f2d2b0abadcf532d48ebf9cb71">
   <xsd:schema xmlns:xsd="http://www.w3.org/2001/XMLSchema" xmlns:xs="http://www.w3.org/2001/XMLSchema" xmlns:p="http://schemas.microsoft.com/office/2006/metadata/properties" xmlns:ns1="http://schemas.microsoft.com/sharepoint/v3" xmlns:ns2="71af3243-3dd4-4a8d-8c0d-dd76da1f02a5" xmlns:ns3="16c05727-aa75-4e4a-9b5f-8a80a1165891" xmlns:ns4="230e9df3-be65-4c73-a93b-d1236ebd677e" targetNamespace="http://schemas.microsoft.com/office/2006/metadata/properties" ma:root="true" ma:fieldsID="7dd78129e6a1811f84807ad11c651531" ns1:_="" ns2:_="" ns3:_="" ns4:_="">
     <xsd:import namespace="http://schemas.microsoft.com/sharepoint/v3"/>
@@ -16048,6 +16958,26 @@
 </ct:contentTypeSchema>
 </file>
 
+<file path=customXml/item2.xml><?xml version="1.0" encoding="utf-8"?>
+<p:properties xmlns:p="http://schemas.microsoft.com/office/2006/metadata/properties" xmlns:xsi="http://www.w3.org/2001/XMLSchema-instance" xmlns:pc="http://schemas.microsoft.com/office/infopath/2007/PartnerControls">
+  <documentManagement>
+    <_ip_UnifiedCompliancePolicyUIAction xmlns="http://schemas.microsoft.com/sharepoint/v3" xsi:nil="true"/>
+    <Image xmlns="71af3243-3dd4-4a8d-8c0d-dd76da1f02a5">
+      <Url xsi:nil="true"/>
+      <Description xsi:nil="true"/>
+    </Image>
+    <Status xmlns="71af3243-3dd4-4a8d-8c0d-dd76da1f02a5">Not started</Status>
+    <Background xmlns="71af3243-3dd4-4a8d-8c0d-dd76da1f02a5">false</Background>
+    <_ip_UnifiedCompliancePolicyProperties xmlns="http://schemas.microsoft.com/sharepoint/v3" xsi:nil="true"/>
+    <ImageTagsTaxHTField xmlns="71af3243-3dd4-4a8d-8c0d-dd76da1f02a5">
+      <Terms xmlns="http://schemas.microsoft.com/office/infopath/2007/PartnerControls"/>
+    </ImageTagsTaxHTField>
+    <TaxCatchAll xmlns="230e9df3-be65-4c73-a93b-d1236ebd677e" xsi:nil="true"/>
+    <MediaServiceKeyPoints xmlns="71af3243-3dd4-4a8d-8c0d-dd76da1f02a5" xsi:nil="true"/>
+  </documentManagement>
+</p:properties>
+</file>
+
 <file path=customXml/item3.xml><?xml version="1.0" encoding="utf-8"?>
 <?mso-contentType ?>
 <FormTemplates xmlns="http://schemas.microsoft.com/sharepoint/v3/contenttype/forms">
@@ -16058,18 +16988,6 @@
 </file>
 
 <file path=customXml/itemProps1.xml><?xml version="1.0" encoding="utf-8"?>
-<ds:datastoreItem xmlns:ds="http://schemas.openxmlformats.org/officeDocument/2006/customXml" ds:itemID="{C325C03C-2AB9-472A-B845-6A8AF27BB7FC}">
-  <ds:schemaRefs>
-    <ds:schemaRef ds:uri="http://schemas.microsoft.com/office/2006/metadata/properties"/>
-    <ds:schemaRef ds:uri="http://schemas.microsoft.com/office/infopath/2007/PartnerControls"/>
-    <ds:schemaRef ds:uri="http://schemas.microsoft.com/sharepoint/v3"/>
-    <ds:schemaRef ds:uri="71af3243-3dd4-4a8d-8c0d-dd76da1f02a5"/>
-    <ds:schemaRef ds:uri="230e9df3-be65-4c73-a93b-d1236ebd677e"/>
-  </ds:schemaRefs>
-</ds:datastoreItem>
-</file>
-
-<file path=customXml/itemProps2.xml><?xml version="1.0" encoding="utf-8"?>
 <ds:datastoreItem xmlns:ds="http://schemas.openxmlformats.org/officeDocument/2006/customXml" ds:itemID="{EA3ACD8C-D672-4B38-852F-3C3D35FA49CC}">
   <ds:schemaRefs>
     <ds:schemaRef ds:uri="http://schemas.microsoft.com/office/2006/metadata/contentType"/>
@@ -16090,6 +17008,18 @@
 </ds:datastoreItem>
 </file>
 
+<file path=customXml/itemProps2.xml><?xml version="1.0" encoding="utf-8"?>
+<ds:datastoreItem xmlns:ds="http://schemas.openxmlformats.org/officeDocument/2006/customXml" ds:itemID="{C325C03C-2AB9-472A-B845-6A8AF27BB7FC}">
+  <ds:schemaRefs>
+    <ds:schemaRef ds:uri="http://schemas.microsoft.com/office/2006/metadata/properties"/>
+    <ds:schemaRef ds:uri="http://schemas.microsoft.com/office/infopath/2007/PartnerControls"/>
+    <ds:schemaRef ds:uri="http://schemas.microsoft.com/sharepoint/v3"/>
+    <ds:schemaRef ds:uri="71af3243-3dd4-4a8d-8c0d-dd76da1f02a5"/>
+    <ds:schemaRef ds:uri="230e9df3-be65-4c73-a93b-d1236ebd677e"/>
+  </ds:schemaRefs>
+</ds:datastoreItem>
+</file>
+
 <file path=customXml/itemProps3.xml><?xml version="1.0" encoding="utf-8"?>
 <ds:datastoreItem xmlns:ds="http://schemas.openxmlformats.org/officeDocument/2006/customXml" ds:itemID="{F28D935D-389D-40E1-8AE8-5A46931C4EC9}">
   <ds:schemaRefs>

</xml_diff>